<commit_message>
updated skeleton and template ppts to fix issues with content over lapping template elements.
</commit_message>
<xml_diff>
--- a/inst/EcoHealthAlliancePPT16x9_classic.pptx
+++ b/inst/EcoHealthAlliancePPT16x9_classic.pptx
@@ -1143,7 +1143,12 @@
             <p:ph idx="1"/>
           </p:nvPr>
         </p:nvSpPr>
-        <p:spPr/>
+        <p:spPr>
+          <a:xfrm>
+            <a:off x="838200" y="1825625"/>
+            <a:ext cx="10515600" cy="3780045"/>
+          </a:xfrm>
+        </p:spPr>
         <p:txBody>
           <a:bodyPr/>
           <a:lstStyle/>
@@ -1273,36 +1278,6 @@
               </a:pPr>
               <a:t>‹#›</a:t>
             </a:fld>
-            <a:endParaRPr lang="en-US"/>
-          </a:p>
-        </p:txBody>
-      </p:sp>
-      <p:sp>
-        <p:nvSpPr>
-          <p:cNvPr id="8" name="Picture Placeholder 7">
-            <a:extLst>
-              <a:ext uri="{FF2B5EF4-FFF2-40B4-BE49-F238E27FC236}">
-                <a16:creationId xmlns:a16="http://schemas.microsoft.com/office/drawing/2014/main" id="{A205BC4B-9ADB-F841-9257-6FFB7F7E0B29}"/>
-              </a:ext>
-            </a:extLst>
-          </p:cNvPr>
-          <p:cNvSpPr>
-            <a:spLocks noGrp="1"/>
-          </p:cNvSpPr>
-          <p:nvPr>
-            <p:ph type="pic" sz="quarter" idx="13"/>
-          </p:nvPr>
-        </p:nvSpPr>
-        <p:spPr>
-          <a:xfrm>
-            <a:off x="838200" y="1825625"/>
-            <a:ext cx="10515600" cy="3725862"/>
-          </a:xfrm>
-        </p:spPr>
-        <p:txBody>
-          <a:bodyPr/>
-          <a:lstStyle/>
-          <a:p>
             <a:endParaRPr lang="en-US"/>
           </a:p>
         </p:txBody>
@@ -1349,7 +1324,7 @@
         </p:nvSpPr>
         <p:spPr>
           <a:xfrm>
-            <a:off x="831851" y="1709740"/>
+            <a:off x="831851" y="1242599"/>
             <a:ext cx="10515600" cy="2852737"/>
           </a:xfrm>
           <a:prstGeom prst="rect">
@@ -1384,7 +1359,7 @@
         </p:nvSpPr>
         <p:spPr>
           <a:xfrm>
-            <a:off x="831851" y="4589465"/>
+            <a:off x="831851" y="4122324"/>
             <a:ext cx="10515600" cy="1500187"/>
           </a:xfrm>
         </p:spPr>
@@ -1655,7 +1630,7 @@
         <p:spPr>
           <a:xfrm>
             <a:off x="838200" y="1825625"/>
-            <a:ext cx="5181600" cy="4351338"/>
+            <a:ext cx="5181600" cy="3809862"/>
           </a:xfrm>
         </p:spPr>
         <p:txBody>
@@ -1987,7 +1962,7 @@
         <p:spPr>
           <a:xfrm>
             <a:off x="839789" y="2505075"/>
-            <a:ext cx="5157787" cy="3684588"/>
+            <a:ext cx="5157787" cy="3036891"/>
           </a:xfrm>
         </p:spPr>
         <p:txBody>
@@ -2683,7 +2658,7 @@
         <p:spPr>
           <a:xfrm>
             <a:off x="839788" y="2057400"/>
-            <a:ext cx="3932237" cy="3811588"/>
+            <a:ext cx="3932237" cy="3518452"/>
           </a:xfrm>
         </p:spPr>
         <p:txBody>
@@ -3165,7 +3140,7 @@
         <p:spPr bwMode="auto">
           <a:xfrm>
             <a:off x="838200" y="1825625"/>
-            <a:ext cx="10515600" cy="4351338"/>
+            <a:ext cx="10515600" cy="3832225"/>
           </a:xfrm>
           <a:prstGeom prst="rect">
             <a:avLst/>
@@ -3193,7 +3168,7 @@
               </a14:hiddenLine>
             </a:ext>
             <a:ext uri="{FAA26D3D-D897-4be2-8F04-BA451C77F1D7}">
-              <ma14:placeholderFlag xmlns:ma14="http://schemas.microsoft.com/office/mac/drawingml/2011/main" xmlns="" val="1"/>
+              <ma14:placeholderFlag xmlns="" xmlns:ma14="http://schemas.microsoft.com/office/mac/drawingml/2011/main" val="1"/>
             </a:ext>
           </a:extLst>
         </p:spPr>
@@ -3490,7 +3465,7 @@
               </a14:hiddenLine>
             </a:ext>
             <a:ext uri="{FAA26D3D-D897-4be2-8F04-BA451C77F1D7}">
-              <ma14:placeholderFlag xmlns:ma14="http://schemas.microsoft.com/office/mac/drawingml/2011/main" xmlns="" val="1"/>
+              <ma14:placeholderFlag xmlns="" xmlns:ma14="http://schemas.microsoft.com/office/mac/drawingml/2011/main" val="1"/>
             </a:ext>
           </a:extLst>
         </p:spPr>

</xml_diff>

<commit_message>
added font embeddign to all slides
</commit_message>
<xml_diff>
--- a/inst/EcoHealthAlliancePPT16x9_classic.pptx
+++ b/inst/EcoHealthAlliancePPT16x9_classic.pptx
@@ -1,6 +1,6 @@
 
 <file path=ppt/presentation.xml><?xml version="1.0" encoding="utf-8"?>
-<p:presentation xmlns:a="http://schemas.openxmlformats.org/drawingml/2006/main" xmlns:r="http://schemas.openxmlformats.org/officeDocument/2006/relationships" xmlns:p="http://schemas.openxmlformats.org/presentationml/2006/main" saveSubsetFonts="1" autoCompressPictures="0">
+<p:presentation xmlns:a="http://schemas.openxmlformats.org/drawingml/2006/main" xmlns:r="http://schemas.openxmlformats.org/officeDocument/2006/relationships" xmlns:p="http://schemas.openxmlformats.org/presentationml/2006/main" embedTrueTypeFonts="1" autoCompressPictures="0">
   <p:sldMasterIdLst>
     <p:sldMasterId id="2147483660" r:id="rId1"/>
   </p:sldMasterIdLst>
@@ -9,6 +9,20 @@
   </p:sldIdLst>
   <p:sldSz cx="12192000" cy="6858000"/>
   <p:notesSz cx="6858000" cy="9144000"/>
+  <p:embeddedFontLst>
+    <p:embeddedFont>
+      <p:font typeface="Calibri" panose="020F0502020204030204" pitchFamily="34" charset="0"/>
+      <p:regular r:id="rId3"/>
+      <p:bold r:id="rId4"/>
+      <p:italic r:id="rId5"/>
+      <p:boldItalic r:id="rId6"/>
+    </p:embeddedFont>
+    <p:embeddedFont>
+      <p:font typeface="Calibri Light" panose="020F0302020204030204" pitchFamily="34" charset="0"/>
+      <p:regular r:id="rId7"/>
+      <p:italic r:id="rId8"/>
+    </p:embeddedFont>
+  </p:embeddedFontLst>
   <p:defaultTextStyle>
     <a:defPPr>
       <a:defRPr lang="en-US"/>
@@ -556,7 +570,7 @@
               <a:pPr>
                 <a:defRPr/>
               </a:pPr>
-              <a:t>7/8/21</a:t>
+              <a:t>7/12/21</a:t>
             </a:fld>
             <a:endParaRPr lang="en-US"/>
           </a:p>
@@ -797,7 +811,7 @@
               <a:pPr>
                 <a:defRPr/>
               </a:pPr>
-              <a:t>7/8/21</a:t>
+              <a:t>7/12/21</a:t>
             </a:fld>
             <a:endParaRPr lang="en-US"/>
           </a:p>
@@ -1007,7 +1021,7 @@
               <a:pPr>
                 <a:defRPr/>
               </a:pPr>
-              <a:t>7/8/21</a:t>
+              <a:t>7/12/21</a:t>
             </a:fld>
             <a:endParaRPr lang="en-US"/>
           </a:p>
@@ -1217,7 +1231,7 @@
               <a:pPr>
                 <a:defRPr/>
               </a:pPr>
-              <a:t>7/8/21</a:t>
+              <a:t>7/12/21</a:t>
             </a:fld>
             <a:endParaRPr lang="en-US"/>
           </a:p>
@@ -1491,7 +1505,7 @@
               <a:pPr>
                 <a:defRPr/>
               </a:pPr>
-              <a:t>7/8/21</a:t>
+              <a:t>7/12/21</a:t>
             </a:fld>
             <a:endParaRPr lang="en-US"/>
           </a:p>
@@ -1758,7 +1772,7 @@
               <a:pPr>
                 <a:defRPr/>
               </a:pPr>
-              <a:t>7/8/21</a:t>
+              <a:t>7/12/21</a:t>
             </a:fld>
             <a:endParaRPr lang="en-US"/>
           </a:p>
@@ -2155,7 +2169,7 @@
               <a:pPr>
                 <a:defRPr/>
               </a:pPr>
-              <a:t>7/8/21</a:t>
+              <a:t>7/12/21</a:t>
             </a:fld>
             <a:endParaRPr lang="en-US"/>
           </a:p>
@@ -2308,7 +2322,7 @@
               <a:pPr>
                 <a:defRPr/>
               </a:pPr>
-              <a:t>7/8/21</a:t>
+              <a:t>7/12/21</a:t>
             </a:fld>
             <a:endParaRPr lang="en-US"/>
           </a:p>
@@ -2430,7 +2444,7 @@
               <a:pPr>
                 <a:defRPr/>
               </a:pPr>
-              <a:t>7/8/21</a:t>
+              <a:t>7/12/21</a:t>
             </a:fld>
             <a:endParaRPr lang="en-US"/>
           </a:p>
@@ -2737,7 +2751,7 @@
               <a:pPr>
                 <a:defRPr/>
               </a:pPr>
-              <a:t>7/8/21</a:t>
+              <a:t>7/12/21</a:t>
             </a:fld>
             <a:endParaRPr lang="en-US"/>
           </a:p>
@@ -3027,7 +3041,7 @@
               <a:pPr>
                 <a:defRPr/>
               </a:pPr>
-              <a:t>7/8/21</a:t>
+              <a:t>7/12/21</a:t>
             </a:fld>
             <a:endParaRPr lang="en-US"/>
           </a:p>
@@ -3168,7 +3182,7 @@
               </a14:hiddenLine>
             </a:ext>
             <a:ext uri="{FAA26D3D-D897-4be2-8F04-BA451C77F1D7}">
-              <ma14:placeholderFlag xmlns="" xmlns:ma14="http://schemas.microsoft.com/office/mac/drawingml/2011/main" val="1"/>
+              <ma14:placeholderFlag xmlns:ma14="http://schemas.microsoft.com/office/mac/drawingml/2011/main" xmlns="" val="1"/>
             </a:ext>
           </a:extLst>
         </p:spPr>
@@ -3264,7 +3278,7 @@
               <a:pPr>
                 <a:defRPr/>
               </a:pPr>
-              <a:t>7/8/21</a:t>
+              <a:t>7/12/21</a:t>
             </a:fld>
             <a:endParaRPr lang="en-US"/>
           </a:p>
@@ -3465,7 +3479,7 @@
               </a14:hiddenLine>
             </a:ext>
             <a:ext uri="{FAA26D3D-D897-4be2-8F04-BA451C77F1D7}">
-              <ma14:placeholderFlag xmlns="" xmlns:ma14="http://schemas.microsoft.com/office/mac/drawingml/2011/main" val="1"/>
+              <ma14:placeholderFlag xmlns:ma14="http://schemas.microsoft.com/office/mac/drawingml/2011/main" xmlns="" val="1"/>
             </a:ext>
           </a:extLst>
         </p:spPr>

</xml_diff>

<commit_message>
avenir and classic ppts no longer knitting corrupt files from local
</commit_message>
<xml_diff>
--- a/inst/EcoHealthAlliancePPT16x9_classic.pptx
+++ b/inst/EcoHealthAlliancePPT16x9_classic.pptx
@@ -1,6 +1,6 @@
 
 <file path=ppt/presentation.xml><?xml version="1.0" encoding="utf-8"?>
-<p:presentation xmlns:a="http://schemas.openxmlformats.org/drawingml/2006/main" xmlns:r="http://schemas.openxmlformats.org/officeDocument/2006/relationships" xmlns:p="http://schemas.openxmlformats.org/presentationml/2006/main" embedTrueTypeFonts="1" autoCompressPictures="0">
+<p:presentation xmlns:a="http://schemas.openxmlformats.org/drawingml/2006/main" xmlns:r="http://schemas.openxmlformats.org/officeDocument/2006/relationships" xmlns:p="http://schemas.openxmlformats.org/presentationml/2006/main" saveSubsetFonts="1" autoCompressPictures="0">
   <p:sldMasterIdLst>
     <p:sldMasterId id="2147483660" r:id="rId1"/>
   </p:sldMasterIdLst>
@@ -9,20 +9,6 @@
   </p:sldIdLst>
   <p:sldSz cx="12192000" cy="6858000"/>
   <p:notesSz cx="6858000" cy="9144000"/>
-  <p:embeddedFontLst>
-    <p:embeddedFont>
-      <p:font typeface="Calibri" panose="020F0502020204030204" pitchFamily="34" charset="0"/>
-      <p:regular r:id="rId3"/>
-      <p:bold r:id="rId4"/>
-      <p:italic r:id="rId5"/>
-      <p:boldItalic r:id="rId6"/>
-    </p:embeddedFont>
-    <p:embeddedFont>
-      <p:font typeface="Calibri Light" panose="020F0302020204030204" pitchFamily="34" charset="0"/>
-      <p:regular r:id="rId7"/>
-      <p:italic r:id="rId8"/>
-    </p:embeddedFont>
-  </p:embeddedFontLst>
   <p:defaultTextStyle>
     <a:defPPr>
       <a:defRPr lang="en-US"/>
@@ -570,7 +556,7 @@
               <a:pPr>
                 <a:defRPr/>
               </a:pPr>
-              <a:t>7/12/21</a:t>
+              <a:t>7/14/21</a:t>
             </a:fld>
             <a:endParaRPr lang="en-US"/>
           </a:p>
@@ -811,7 +797,7 @@
               <a:pPr>
                 <a:defRPr/>
               </a:pPr>
-              <a:t>7/12/21</a:t>
+              <a:t>7/14/21</a:t>
             </a:fld>
             <a:endParaRPr lang="en-US"/>
           </a:p>
@@ -1021,7 +1007,7 @@
               <a:pPr>
                 <a:defRPr/>
               </a:pPr>
-              <a:t>7/12/21</a:t>
+              <a:t>7/14/21</a:t>
             </a:fld>
             <a:endParaRPr lang="en-US"/>
           </a:p>
@@ -1100,7 +1086,7 @@
 </file>
 
 <file path=ppt/slideLayouts/slideLayout2.xml><?xml version="1.0" encoding="utf-8"?>
-<p:sldLayout xmlns:a="http://schemas.openxmlformats.org/drawingml/2006/main" xmlns:r="http://schemas.openxmlformats.org/officeDocument/2006/relationships" xmlns:p="http://schemas.openxmlformats.org/presentationml/2006/main" preserve="1" userDrawn="1">
+<p:sldLayout xmlns:a="http://schemas.openxmlformats.org/drawingml/2006/main" xmlns:r="http://schemas.openxmlformats.org/officeDocument/2006/relationships" xmlns:p="http://schemas.openxmlformats.org/presentationml/2006/main" type="obj" preserve="1">
   <p:cSld name="Title and Content">
     <p:spTree>
       <p:nvGrpSpPr>
@@ -1157,12 +1143,7 @@
             <p:ph idx="1"/>
           </p:nvPr>
         </p:nvSpPr>
-        <p:spPr>
-          <a:xfrm>
-            <a:off x="838200" y="1825625"/>
-            <a:ext cx="10515600" cy="3780045"/>
-          </a:xfrm>
-        </p:spPr>
+        <p:spPr/>
         <p:txBody>
           <a:bodyPr/>
           <a:lstStyle/>
@@ -1231,7 +1212,7 @@
               <a:pPr>
                 <a:defRPr/>
               </a:pPr>
-              <a:t>7/12/21</a:t>
+              <a:t>7/14/21</a:t>
             </a:fld>
             <a:endParaRPr lang="en-US"/>
           </a:p>
@@ -1338,7 +1319,7 @@
         </p:nvSpPr>
         <p:spPr>
           <a:xfrm>
-            <a:off x="831851" y="1242599"/>
+            <a:off x="831851" y="1709740"/>
             <a:ext cx="10515600" cy="2852737"/>
           </a:xfrm>
           <a:prstGeom prst="rect">
@@ -1373,7 +1354,7 @@
         </p:nvSpPr>
         <p:spPr>
           <a:xfrm>
-            <a:off x="831851" y="4122324"/>
+            <a:off x="831851" y="4589465"/>
             <a:ext cx="10515600" cy="1500187"/>
           </a:xfrm>
         </p:spPr>
@@ -1505,7 +1486,7 @@
               <a:pPr>
                 <a:defRPr/>
               </a:pPr>
-              <a:t>7/12/21</a:t>
+              <a:t>7/14/21</a:t>
             </a:fld>
             <a:endParaRPr lang="en-US"/>
           </a:p>
@@ -1644,7 +1625,7 @@
         <p:spPr>
           <a:xfrm>
             <a:off x="838200" y="1825625"/>
-            <a:ext cx="5181600" cy="3809862"/>
+            <a:ext cx="5181600" cy="4351338"/>
           </a:xfrm>
         </p:spPr>
         <p:txBody>
@@ -1772,7 +1753,7 @@
               <a:pPr>
                 <a:defRPr/>
               </a:pPr>
-              <a:t>7/12/21</a:t>
+              <a:t>7/14/21</a:t>
             </a:fld>
             <a:endParaRPr lang="en-US"/>
           </a:p>
@@ -1976,7 +1957,7 @@
         <p:spPr>
           <a:xfrm>
             <a:off x="839789" y="2505075"/>
-            <a:ext cx="5157787" cy="3036891"/>
+            <a:ext cx="5157787" cy="3684588"/>
           </a:xfrm>
         </p:spPr>
         <p:txBody>
@@ -2169,7 +2150,7 @@
               <a:pPr>
                 <a:defRPr/>
               </a:pPr>
-              <a:t>7/12/21</a:t>
+              <a:t>7/14/21</a:t>
             </a:fld>
             <a:endParaRPr lang="en-US"/>
           </a:p>
@@ -2322,7 +2303,7 @@
               <a:pPr>
                 <a:defRPr/>
               </a:pPr>
-              <a:t>7/12/21</a:t>
+              <a:t>7/14/21</a:t>
             </a:fld>
             <a:endParaRPr lang="en-US"/>
           </a:p>
@@ -2444,7 +2425,7 @@
               <a:pPr>
                 <a:defRPr/>
               </a:pPr>
-              <a:t>7/12/21</a:t>
+              <a:t>7/14/21</a:t>
             </a:fld>
             <a:endParaRPr lang="en-US"/>
           </a:p>
@@ -2672,7 +2653,7 @@
         <p:spPr>
           <a:xfrm>
             <a:off x="839788" y="2057400"/>
-            <a:ext cx="3932237" cy="3518452"/>
+            <a:ext cx="3932237" cy="3811588"/>
           </a:xfrm>
         </p:spPr>
         <p:txBody>
@@ -2751,7 +2732,7 @@
               <a:pPr>
                 <a:defRPr/>
               </a:pPr>
-              <a:t>7/12/21</a:t>
+              <a:t>7/14/21</a:t>
             </a:fld>
             <a:endParaRPr lang="en-US"/>
           </a:p>
@@ -3041,7 +3022,7 @@
               <a:pPr>
                 <a:defRPr/>
               </a:pPr>
-              <a:t>7/12/21</a:t>
+              <a:t>7/14/21</a:t>
             </a:fld>
             <a:endParaRPr lang="en-US"/>
           </a:p>
@@ -3154,7 +3135,7 @@
         <p:spPr bwMode="auto">
           <a:xfrm>
             <a:off x="838200" y="1825625"/>
-            <a:ext cx="10515600" cy="3832225"/>
+            <a:ext cx="10515600" cy="4351338"/>
           </a:xfrm>
           <a:prstGeom prst="rect">
             <a:avLst/>
@@ -3278,7 +3259,7 @@
               <a:pPr>
                 <a:defRPr/>
               </a:pPr>
-              <a:t>7/12/21</a:t>
+              <a:t>7/14/21</a:t>
             </a:fld>
             <a:endParaRPr lang="en-US"/>
           </a:p>

</xml_diff>